<commit_message>
created homepage layout and added first project content in the grid
</commit_message>
<xml_diff>
--- a/Vorlage Project Bilder.pptx
+++ b/Vorlage Project Bilder.pptx
@@ -6,7 +6,8 @@
   </p:sldMasterIdLst>
   <p:sldIdLst>
     <p:sldId id="256" r:id="rId2"/>
-    <p:sldId id="257" r:id="rId3"/>
+    <p:sldId id="258" r:id="rId3"/>
+    <p:sldId id="257" r:id="rId4"/>
   </p:sldIdLst>
   <p:sldSz cx="12192000" cy="6858000"/>
   <p:notesSz cx="6858000" cy="9144000"/>
@@ -105,6 +106,11 @@
       </a:defRPr>
     </a:lvl9pPr>
   </p:defaultTextStyle>
+  <p:extLst>
+    <p:ext uri="{EFAFB233-063F-42B5-8137-9DF3F51BA10A}">
+      <p15:sldGuideLst xmlns:p15="http://schemas.microsoft.com/office/powerpoint/2012/main"/>
+    </p:ext>
+  </p:extLst>
 </p:presentation>
 </file>
 
@@ -255,7 +261,7 @@
           <a:p>
             <a:fld id="{199F7492-6069-4BCD-9815-DCC65EB9BFCC}" type="datetimeFigureOut">
               <a:rPr lang="de-DE" smtClean="0"/>
-              <a:t>22.02.2022</a:t>
+              <a:t>23.02.2022</a:t>
             </a:fld>
             <a:endParaRPr lang="de-DE"/>
           </a:p>
@@ -453,7 +459,7 @@
           <a:p>
             <a:fld id="{199F7492-6069-4BCD-9815-DCC65EB9BFCC}" type="datetimeFigureOut">
               <a:rPr lang="de-DE" smtClean="0"/>
-              <a:t>22.02.2022</a:t>
+              <a:t>23.02.2022</a:t>
             </a:fld>
             <a:endParaRPr lang="de-DE"/>
           </a:p>
@@ -661,7 +667,7 @@
           <a:p>
             <a:fld id="{199F7492-6069-4BCD-9815-DCC65EB9BFCC}" type="datetimeFigureOut">
               <a:rPr lang="de-DE" smtClean="0"/>
-              <a:t>22.02.2022</a:t>
+              <a:t>23.02.2022</a:t>
             </a:fld>
             <a:endParaRPr lang="de-DE"/>
           </a:p>
@@ -859,7 +865,7 @@
           <a:p>
             <a:fld id="{199F7492-6069-4BCD-9815-DCC65EB9BFCC}" type="datetimeFigureOut">
               <a:rPr lang="de-DE" smtClean="0"/>
-              <a:t>22.02.2022</a:t>
+              <a:t>23.02.2022</a:t>
             </a:fld>
             <a:endParaRPr lang="de-DE"/>
           </a:p>
@@ -1134,7 +1140,7 @@
           <a:p>
             <a:fld id="{199F7492-6069-4BCD-9815-DCC65EB9BFCC}" type="datetimeFigureOut">
               <a:rPr lang="de-DE" smtClean="0"/>
-              <a:t>22.02.2022</a:t>
+              <a:t>23.02.2022</a:t>
             </a:fld>
             <a:endParaRPr lang="de-DE"/>
           </a:p>
@@ -1399,7 +1405,7 @@
           <a:p>
             <a:fld id="{199F7492-6069-4BCD-9815-DCC65EB9BFCC}" type="datetimeFigureOut">
               <a:rPr lang="de-DE" smtClean="0"/>
-              <a:t>22.02.2022</a:t>
+              <a:t>23.02.2022</a:t>
             </a:fld>
             <a:endParaRPr lang="de-DE"/>
           </a:p>
@@ -1811,7 +1817,7 @@
           <a:p>
             <a:fld id="{199F7492-6069-4BCD-9815-DCC65EB9BFCC}" type="datetimeFigureOut">
               <a:rPr lang="de-DE" smtClean="0"/>
-              <a:t>22.02.2022</a:t>
+              <a:t>23.02.2022</a:t>
             </a:fld>
             <a:endParaRPr lang="de-DE"/>
           </a:p>
@@ -1952,7 +1958,7 @@
           <a:p>
             <a:fld id="{199F7492-6069-4BCD-9815-DCC65EB9BFCC}" type="datetimeFigureOut">
               <a:rPr lang="de-DE" smtClean="0"/>
-              <a:t>22.02.2022</a:t>
+              <a:t>23.02.2022</a:t>
             </a:fld>
             <a:endParaRPr lang="de-DE"/>
           </a:p>
@@ -2065,7 +2071,7 @@
           <a:p>
             <a:fld id="{199F7492-6069-4BCD-9815-DCC65EB9BFCC}" type="datetimeFigureOut">
               <a:rPr lang="de-DE" smtClean="0"/>
-              <a:t>22.02.2022</a:t>
+              <a:t>23.02.2022</a:t>
             </a:fld>
             <a:endParaRPr lang="de-DE"/>
           </a:p>
@@ -2376,7 +2382,7 @@
           <a:p>
             <a:fld id="{199F7492-6069-4BCD-9815-DCC65EB9BFCC}" type="datetimeFigureOut">
               <a:rPr lang="de-DE" smtClean="0"/>
-              <a:t>22.02.2022</a:t>
+              <a:t>23.02.2022</a:t>
             </a:fld>
             <a:endParaRPr lang="de-DE"/>
           </a:p>
@@ -2664,7 +2670,7 @@
           <a:p>
             <a:fld id="{199F7492-6069-4BCD-9815-DCC65EB9BFCC}" type="datetimeFigureOut">
               <a:rPr lang="de-DE" smtClean="0"/>
-              <a:t>22.02.2022</a:t>
+              <a:t>23.02.2022</a:t>
             </a:fld>
             <a:endParaRPr lang="de-DE"/>
           </a:p>
@@ -2905,7 +2911,7 @@
           <a:p>
             <a:fld id="{199F7492-6069-4BCD-9815-DCC65EB9BFCC}" type="datetimeFigureOut">
               <a:rPr lang="de-DE" smtClean="0"/>
-              <a:t>22.02.2022</a:t>
+              <a:t>23.02.2022</a:t>
             </a:fld>
             <a:endParaRPr lang="de-DE"/>
           </a:p>
@@ -3418,6 +3424,96 @@
           <a:chExt cx="0" cy="0"/>
         </a:xfrm>
       </p:grpSpPr>
+      <p:pic>
+        <p:nvPicPr>
+          <p:cNvPr id="14" name="Grafik 13">
+            <a:extLst>
+              <a:ext uri="{FF2B5EF4-FFF2-40B4-BE49-F238E27FC236}">
+                <a16:creationId xmlns:a16="http://schemas.microsoft.com/office/drawing/2014/main" id="{3395CB97-82F1-460C-AA51-AA3C75AE2EDA}"/>
+              </a:ext>
+            </a:extLst>
+          </p:cNvPr>
+          <p:cNvPicPr>
+            <a:picLocks noChangeAspect="1"/>
+          </p:cNvPicPr>
+          <p:nvPr/>
+        </p:nvPicPr>
+        <p:blipFill>
+          <a:blip r:embed="rId2"/>
+          <a:stretch>
+            <a:fillRect/>
+          </a:stretch>
+        </p:blipFill>
+        <p:spPr>
+          <a:xfrm>
+            <a:off x="0" y="0"/>
+            <a:ext cx="12192000" cy="7565722"/>
+          </a:xfrm>
+          <a:prstGeom prst="rect">
+            <a:avLst/>
+          </a:prstGeom>
+        </p:spPr>
+      </p:pic>
+      <p:pic>
+        <p:nvPicPr>
+          <p:cNvPr id="5" name="Grafik 4">
+            <a:extLst>
+              <a:ext uri="{FF2B5EF4-FFF2-40B4-BE49-F238E27FC236}">
+                <a16:creationId xmlns:a16="http://schemas.microsoft.com/office/drawing/2014/main" id="{8B04E2E3-6139-463F-8202-963A5F7DB81E}"/>
+              </a:ext>
+            </a:extLst>
+          </p:cNvPr>
+          <p:cNvPicPr>
+            <a:picLocks noChangeAspect="1"/>
+          </p:cNvPicPr>
+          <p:nvPr/>
+        </p:nvPicPr>
+        <p:blipFill>
+          <a:blip r:embed="rId3"/>
+          <a:stretch>
+            <a:fillRect/>
+          </a:stretch>
+        </p:blipFill>
+        <p:spPr>
+          <a:xfrm>
+            <a:off x="3007235" y="1378800"/>
+            <a:ext cx="6177530" cy="4100400"/>
+          </a:xfrm>
+          <a:prstGeom prst="rect">
+            <a:avLst/>
+          </a:prstGeom>
+        </p:spPr>
+      </p:pic>
+    </p:spTree>
+    <p:extLst>
+      <p:ext uri="{BB962C8B-B14F-4D97-AF65-F5344CB8AC3E}">
+        <p14:creationId xmlns:p14="http://schemas.microsoft.com/office/powerpoint/2010/main" val="3648985687"/>
+      </p:ext>
+    </p:extLst>
+  </p:cSld>
+  <p:clrMapOvr>
+    <a:masterClrMapping/>
+  </p:clrMapOvr>
+</p:sld>
+</file>
+
+<file path=ppt/slides/slide3.xml><?xml version="1.0" encoding="utf-8"?>
+<p:sld xmlns:a="http://schemas.openxmlformats.org/drawingml/2006/main" xmlns:r="http://schemas.openxmlformats.org/officeDocument/2006/relationships" xmlns:p="http://schemas.openxmlformats.org/presentationml/2006/main">
+  <p:cSld>
+    <p:spTree>
+      <p:nvGrpSpPr>
+        <p:cNvPr id="1" name=""/>
+        <p:cNvGrpSpPr/>
+        <p:nvPr/>
+      </p:nvGrpSpPr>
+      <p:grpSpPr>
+        <a:xfrm>
+          <a:off x="0" y="0"/>
+          <a:ext cx="0" cy="0"/>
+          <a:chOff x="0" y="0"/>
+          <a:chExt cx="0" cy="0"/>
+        </a:xfrm>
+      </p:grpSpPr>
       <p:sp>
         <p:nvSpPr>
           <p:cNvPr id="2" name="Titel 1">

</xml_diff>